<commit_message>
add cardinality.pptx uncountable_sets.pptx draft halting-problem.pptx
</commit_message>
<xml_diff>
--- a/spring12/slidesS12/recursive-data.pptx
+++ b/spring12/slidesS12/recursive-data.pptx
@@ -944,6 +944,186 @@
       </p:grpSpPr>
       <p:sp>
         <p:nvSpPr>
+          <p:cNvPr id="2" name="Slide Image Placeholder 1"/>
+          <p:cNvSpPr>
+            <a:spLocks noGrp="1" noRot="1" noChangeAspect="1"/>
+          </p:cNvSpPr>
+          <p:nvPr>
+            <p:ph type="sldImg"/>
+          </p:nvPr>
+        </p:nvSpPr>
+        <p:spPr/>
+      </p:sp>
+      <p:sp>
+        <p:nvSpPr>
+          <p:cNvPr id="3" name="Notes Placeholder 2"/>
+          <p:cNvSpPr>
+            <a:spLocks noGrp="1"/>
+          </p:cNvSpPr>
+          <p:nvPr>
+            <p:ph type="body" idx="1"/>
+          </p:nvPr>
+        </p:nvSpPr>
+        <p:spPr/>
+        <p:txBody>
+          <a:bodyPr/>
+          <a:lstStyle/>
+          <a:p>
+            <a:endParaRPr lang="en-US"/>
+          </a:p>
+        </p:txBody>
+      </p:sp>
+      <p:sp>
+        <p:nvSpPr>
+          <p:cNvPr id="4" name="Slide Number Placeholder 3"/>
+          <p:cNvSpPr>
+            <a:spLocks noGrp="1"/>
+          </p:cNvSpPr>
+          <p:nvPr>
+            <p:ph type="sldNum" sz="quarter" idx="10"/>
+          </p:nvPr>
+        </p:nvSpPr>
+        <p:spPr/>
+        <p:txBody>
+          <a:bodyPr/>
+          <a:lstStyle/>
+          <a:p>
+            <a:pPr>
+              <a:defRPr/>
+            </a:pPr>
+            <a:fld id="{C9E94AB6-6CB8-4AAF-A1ED-7A62C60EB524}" type="slidenum">
+              <a:rPr lang="en-US" smtClean="0"/>
+              <a:pPr>
+                <a:defRPr/>
+              </a:pPr>
+              <a:t>10</a:t>
+            </a:fld>
+            <a:endParaRPr lang="en-US"/>
+          </a:p>
+        </p:txBody>
+      </p:sp>
+    </p:spTree>
+    <p:extLst>
+      <p:ext uri="{BB962C8B-B14F-4D97-AF65-F5344CB8AC3E}">
+        <p14:creationId xmlns:p14="http://schemas.microsoft.com/office/powerpoint/2010/main" val="655388804"/>
+      </p:ext>
+    </p:extLst>
+  </p:cSld>
+  <p:clrMapOvr>
+    <a:masterClrMapping/>
+  </p:clrMapOvr>
+</p:notes>
+</file>
+
+<file path=ppt/notesSlides/notesSlide11.xml><?xml version="1.0" encoding="utf-8"?>
+<p:notes xmlns:a="http://schemas.openxmlformats.org/drawingml/2006/main" xmlns:r="http://schemas.openxmlformats.org/officeDocument/2006/relationships" xmlns:p="http://schemas.openxmlformats.org/presentationml/2006/main">
+  <p:cSld>
+    <p:spTree>
+      <p:nvGrpSpPr>
+        <p:cNvPr id="1" name=""/>
+        <p:cNvGrpSpPr/>
+        <p:nvPr/>
+      </p:nvGrpSpPr>
+      <p:grpSpPr>
+        <a:xfrm>
+          <a:off x="0" y="0"/>
+          <a:ext cx="0" cy="0"/>
+          <a:chOff x="0" y="0"/>
+          <a:chExt cx="0" cy="0"/>
+        </a:xfrm>
+      </p:grpSpPr>
+      <p:sp>
+        <p:nvSpPr>
+          <p:cNvPr id="2" name="Slide Image Placeholder 1"/>
+          <p:cNvSpPr>
+            <a:spLocks noGrp="1" noRot="1" noChangeAspect="1"/>
+          </p:cNvSpPr>
+          <p:nvPr>
+            <p:ph type="sldImg"/>
+          </p:nvPr>
+        </p:nvSpPr>
+        <p:spPr/>
+      </p:sp>
+      <p:sp>
+        <p:nvSpPr>
+          <p:cNvPr id="3" name="Notes Placeholder 2"/>
+          <p:cNvSpPr>
+            <a:spLocks noGrp="1"/>
+          </p:cNvSpPr>
+          <p:nvPr>
+            <p:ph type="body" idx="1"/>
+          </p:nvPr>
+        </p:nvSpPr>
+        <p:spPr/>
+        <p:txBody>
+          <a:bodyPr/>
+          <a:lstStyle/>
+          <a:p>
+            <a:endParaRPr lang="en-US"/>
+          </a:p>
+        </p:txBody>
+      </p:sp>
+      <p:sp>
+        <p:nvSpPr>
+          <p:cNvPr id="4" name="Slide Number Placeholder 3"/>
+          <p:cNvSpPr>
+            <a:spLocks noGrp="1"/>
+          </p:cNvSpPr>
+          <p:nvPr>
+            <p:ph type="sldNum" sz="quarter" idx="10"/>
+          </p:nvPr>
+        </p:nvSpPr>
+        <p:spPr/>
+        <p:txBody>
+          <a:bodyPr/>
+          <a:lstStyle/>
+          <a:p>
+            <a:pPr>
+              <a:defRPr/>
+            </a:pPr>
+            <a:fld id="{C9E94AB6-6CB8-4AAF-A1ED-7A62C60EB524}" type="slidenum">
+              <a:rPr lang="en-US" smtClean="0"/>
+              <a:pPr>
+                <a:defRPr/>
+              </a:pPr>
+              <a:t>11</a:t>
+            </a:fld>
+            <a:endParaRPr lang="en-US"/>
+          </a:p>
+        </p:txBody>
+      </p:sp>
+    </p:spTree>
+    <p:extLst>
+      <p:ext uri="{BB962C8B-B14F-4D97-AF65-F5344CB8AC3E}">
+        <p14:creationId xmlns:p14="http://schemas.microsoft.com/office/powerpoint/2010/main" val="55946196"/>
+      </p:ext>
+    </p:extLst>
+  </p:cSld>
+  <p:clrMapOvr>
+    <a:masterClrMapping/>
+  </p:clrMapOvr>
+</p:notes>
+</file>
+
+<file path=ppt/notesSlides/notesSlide12.xml><?xml version="1.0" encoding="utf-8"?>
+<p:notes xmlns:a="http://schemas.openxmlformats.org/drawingml/2006/main" xmlns:r="http://schemas.openxmlformats.org/officeDocument/2006/relationships" xmlns:p="http://schemas.openxmlformats.org/presentationml/2006/main">
+  <p:cSld>
+    <p:spTree>
+      <p:nvGrpSpPr>
+        <p:cNvPr id="1" name=""/>
+        <p:cNvGrpSpPr/>
+        <p:nvPr/>
+      </p:nvGrpSpPr>
+      <p:grpSpPr>
+        <a:xfrm>
+          <a:off x="0" y="0"/>
+          <a:ext cx="0" cy="0"/>
+          <a:chOff x="0" y="0"/>
+          <a:chExt cx="0" cy="0"/>
+        </a:xfrm>
+      </p:grpSpPr>
+      <p:sp>
+        <p:nvSpPr>
           <p:cNvPr id="67586" name="Rectangle 7"/>
           <p:cNvSpPr>
             <a:spLocks noGrp="1" noChangeArrowheads="1"/>
@@ -1013,7 +1193,7 @@
 </p:notes>
 </file>
 
-<file path=ppt/notesSlides/notesSlide11.xml><?xml version="1.0" encoding="utf-8"?>
+<file path=ppt/notesSlides/notesSlide13.xml><?xml version="1.0" encoding="utf-8"?>
 <p:notes xmlns:a="http://schemas.openxmlformats.org/drawingml/2006/main" xmlns:r="http://schemas.openxmlformats.org/officeDocument/2006/relationships" xmlns:p="http://schemas.openxmlformats.org/presentationml/2006/main">
   <p:cSld>
     <p:spTree>
@@ -1101,7 +1281,7 @@
 </p:notes>
 </file>
 
-<file path=ppt/notesSlides/notesSlide12.xml><?xml version="1.0" encoding="utf-8"?>
+<file path=ppt/notesSlides/notesSlide14.xml><?xml version="1.0" encoding="utf-8"?>
 <p:notes xmlns:a="http://schemas.openxmlformats.org/drawingml/2006/main" xmlns:r="http://schemas.openxmlformats.org/officeDocument/2006/relationships" xmlns:p="http://schemas.openxmlformats.org/presentationml/2006/main">
   <p:cSld>
     <p:spTree>
@@ -4316,12 +4496,12 @@
           <a:graphicData uri="http://schemas.openxmlformats.org/presentationml/2006/ole">
             <mc:AlternateContent xmlns:mc="http://schemas.openxmlformats.org/markup-compatibility/2006">
               <mc:Choice xmlns:v="urn:schemas-microsoft-com:vml" Requires="v">
-                <p:oleObj spid="_x0000_s48176" name="Equation" r:id="rId3" imgW="76200" imgH="165100" progId="Equation.DSMT4">
+                <p:oleObj spid="_x0000_s48182" name="Equation" r:id="rId4" imgW="76200" imgH="165100" progId="Equation.DSMT4">
                   <p:embed/>
                 </p:oleObj>
               </mc:Choice>
               <mc:Fallback>
-                <p:oleObj name="Equation" r:id="rId3" imgW="76200" imgH="165100" progId="Equation.DSMT4">
+                <p:oleObj name="Equation" r:id="rId4" imgW="76200" imgH="165100" progId="Equation.DSMT4">
                   <p:embed/>
                   <p:pic>
                     <p:nvPicPr>
@@ -4332,7 +4512,7 @@
                       <p:nvPr/>
                     </p:nvPicPr>
                     <p:blipFill>
-                      <a:blip r:embed="rId4">
+                      <a:blip r:embed="rId5">
                         <a:extLst>
                           <a:ext uri="{28A0092B-C50C-407E-A947-70E740481C1C}">
                             <a14:useLocalDpi xmlns:a14="http://schemas.microsoft.com/office/drawing/2010/main" val="0"/>
@@ -4386,12 +4566,12 @@
           <a:graphicData uri="http://schemas.openxmlformats.org/presentationml/2006/ole">
             <mc:AlternateContent xmlns:mc="http://schemas.openxmlformats.org/markup-compatibility/2006">
               <mc:Choice xmlns:v="urn:schemas-microsoft-com:vml" Requires="v">
-                <p:oleObj spid="_x0000_s48177" name="Equation" r:id="rId5" imgW="76200" imgH="165100" progId="Equation.DSMT4">
+                <p:oleObj spid="_x0000_s48183" name="Equation" r:id="rId6" imgW="76200" imgH="165100" progId="Equation.DSMT4">
                   <p:embed/>
                 </p:oleObj>
               </mc:Choice>
               <mc:Fallback>
-                <p:oleObj name="Equation" r:id="rId5" imgW="76200" imgH="165100" progId="Equation.DSMT4">
+                <p:oleObj name="Equation" r:id="rId6" imgW="76200" imgH="165100" progId="Equation.DSMT4">
                   <p:embed/>
                   <p:pic>
                     <p:nvPicPr>
@@ -4402,7 +4582,7 @@
                       <p:nvPr/>
                     </p:nvPicPr>
                     <p:blipFill>
-                      <a:blip r:embed="rId6">
+                      <a:blip r:embed="rId7">
                         <a:extLst>
                           <a:ext uri="{28A0092B-C50C-407E-A947-70E740481C1C}">
                             <a14:useLocalDpi xmlns:a14="http://schemas.microsoft.com/office/drawing/2010/main" val="0"/>
@@ -4456,12 +4636,12 @@
           <a:graphicData uri="http://schemas.openxmlformats.org/presentationml/2006/ole">
             <mc:AlternateContent xmlns:mc="http://schemas.openxmlformats.org/markup-compatibility/2006">
               <mc:Choice xmlns:v="urn:schemas-microsoft-com:vml" Requires="v">
-                <p:oleObj spid="_x0000_s48178" name="Equation" r:id="rId7" imgW="76200" imgH="165100" progId="Equation.DSMT4">
+                <p:oleObj spid="_x0000_s48184" name="Equation" r:id="rId8" imgW="76200" imgH="165100" progId="Equation.DSMT4">
                   <p:embed/>
                 </p:oleObj>
               </mc:Choice>
               <mc:Fallback>
-                <p:oleObj name="Equation" r:id="rId7" imgW="76200" imgH="165100" progId="Equation.DSMT4">
+                <p:oleObj name="Equation" r:id="rId8" imgW="76200" imgH="165100" progId="Equation.DSMT4">
                   <p:embed/>
                   <p:pic>
                     <p:nvPicPr>
@@ -4472,7 +4652,7 @@
                       <p:nvPr/>
                     </p:nvPicPr>
                     <p:blipFill>
-                      <a:blip r:embed="rId8">
+                      <a:blip r:embed="rId9">
                         <a:extLst>
                           <a:ext uri="{28A0092B-C50C-407E-A947-70E740481C1C}">
                             <a14:useLocalDpi xmlns:a14="http://schemas.microsoft.com/office/drawing/2010/main" val="0"/>
@@ -7624,7 +7804,7 @@
           <a:graphicData uri="http://schemas.openxmlformats.org/presentationml/2006/ole">
             <mc:AlternateContent xmlns:mc="http://schemas.openxmlformats.org/markup-compatibility/2006">
               <mc:Choice xmlns:v="urn:schemas-microsoft-com:vml" Requires="v">
-                <p:oleObj spid="_x0000_s1025" name="Equation" r:id="rId4" imgW="114120" imgH="177480" progId="Equation.DSMT4">
+                <p:oleObj spid="_x0000_s1029" name="Equation" r:id="rId4" imgW="114120" imgH="177480" progId="Equation.DSMT4">
                   <p:embed/>
                 </p:oleObj>
               </mc:Choice>
@@ -7696,7 +7876,7 @@
           <a:graphicData uri="http://schemas.openxmlformats.org/presentationml/2006/ole">
             <mc:AlternateContent xmlns:mc="http://schemas.openxmlformats.org/markup-compatibility/2006">
               <mc:Choice xmlns:v="urn:schemas-microsoft-com:vml" Requires="v">
-                <p:oleObj spid="_x0000_s1026" name="Equation" r:id="rId6" imgW="253800" imgH="228600" progId="Equation.3">
+                <p:oleObj spid="_x0000_s1030" name="Equation" r:id="rId6" imgW="253800" imgH="228600" progId="Equation.3">
                   <p:embed/>
                 </p:oleObj>
               </mc:Choice>
@@ -8500,9 +8680,14 @@
           <a:p>
             <a:pPr eaLnBrk="1" hangingPunct="1"/>
             <a:r>
-              <a:rPr lang="en-US" smtClean="0"/>
-              <a:t>Recursive Deﬁnitions</a:t>
-            </a:r>
+              <a:rPr lang="en-US" dirty="0" smtClean="0"/>
+              <a:t>Recursive </a:t>
+            </a:r>
+            <a:r>
+              <a:rPr lang="en-US" dirty="0" smtClean="0"/>
+              <a:t>Data</a:t>
+            </a:r>
+            <a:endParaRPr lang="en-US" dirty="0" smtClean="0"/>
           </a:p>
         </p:txBody>
       </p:sp>

</xml_diff>

<commit_message>
add haltingproblem.pptx, edit recursive-data.pptx & recursive-functions.pptx
</commit_message>
<xml_diff>
--- a/spring12/slidesS12/recursive-data.pptx
+++ b/spring12/slidesS12/recursive-data.pptx
@@ -4496,7 +4496,7 @@
           <a:graphicData uri="http://schemas.openxmlformats.org/presentationml/2006/ole">
             <mc:AlternateContent xmlns:mc="http://schemas.openxmlformats.org/markup-compatibility/2006">
               <mc:Choice xmlns:v="urn:schemas-microsoft-com:vml" Requires="v">
-                <p:oleObj spid="_x0000_s48182" name="Equation" r:id="rId4" imgW="76200" imgH="165100" progId="Equation.DSMT4">
+                <p:oleObj spid="_x0000_s48189" name="Equation" r:id="rId4" imgW="76200" imgH="165100" progId="Equation.DSMT4">
                   <p:embed/>
                 </p:oleObj>
               </mc:Choice>
@@ -4566,7 +4566,7 @@
           <a:graphicData uri="http://schemas.openxmlformats.org/presentationml/2006/ole">
             <mc:AlternateContent xmlns:mc="http://schemas.openxmlformats.org/markup-compatibility/2006">
               <mc:Choice xmlns:v="urn:schemas-microsoft-com:vml" Requires="v">
-                <p:oleObj spid="_x0000_s48183" name="Equation" r:id="rId6" imgW="76200" imgH="165100" progId="Equation.DSMT4">
+                <p:oleObj spid="_x0000_s48190" name="Equation" r:id="rId6" imgW="76200" imgH="165100" progId="Equation.DSMT4">
                   <p:embed/>
                 </p:oleObj>
               </mc:Choice>
@@ -4636,7 +4636,7 @@
           <a:graphicData uri="http://schemas.openxmlformats.org/presentationml/2006/ole">
             <mc:AlternateContent xmlns:mc="http://schemas.openxmlformats.org/markup-compatibility/2006">
               <mc:Choice xmlns:v="urn:schemas-microsoft-com:vml" Requires="v">
-                <p:oleObj spid="_x0000_s48184" name="Equation" r:id="rId8" imgW="76200" imgH="165100" progId="Equation.DSMT4">
+                <p:oleObj spid="_x0000_s48191" name="Equation" r:id="rId8" imgW="76200" imgH="165100" progId="Equation.DSMT4">
                   <p:embed/>
                 </p:oleObj>
               </mc:Choice>
@@ -6353,13 +6353,13 @@
   <p:clrMapOvr>
     <a:masterClrMapping/>
   </p:clrMapOvr>
-  <mc:AlternateContent xmlns:mc="http://schemas.openxmlformats.org/markup-compatibility/2006">
-    <mc:Choice xmlns:p14="http://schemas.microsoft.com/office/powerpoint/2010/main" Requires="p14">
+  <mc:AlternateContent xmlns:mc="http://schemas.openxmlformats.org/markup-compatibility/2006" xmlns:p14="http://schemas.microsoft.com/office/powerpoint/2010/main">
+    <mc:Choice Requires="p14">
       <p:transition spd="med" p14:dur="700">
         <p:fade/>
       </p:transition>
     </mc:Choice>
-    <mc:Fallback>
+    <mc:Fallback xmlns="">
       <p:transition xmlns:p14="http://schemas.microsoft.com/office/powerpoint/2010/main" spd="med">
         <p:fade/>
       </p:transition>
@@ -7804,7 +7804,7 @@
           <a:graphicData uri="http://schemas.openxmlformats.org/presentationml/2006/ole">
             <mc:AlternateContent xmlns:mc="http://schemas.openxmlformats.org/markup-compatibility/2006">
               <mc:Choice xmlns:v="urn:schemas-microsoft-com:vml" Requires="v">
-                <p:oleObj spid="_x0000_s1029" name="Equation" r:id="rId4" imgW="114120" imgH="177480" progId="Equation.DSMT4">
+                <p:oleObj spid="_x0000_s1034" name="Equation" r:id="rId4" imgW="114120" imgH="177480" progId="Equation.DSMT4">
                   <p:embed/>
                 </p:oleObj>
               </mc:Choice>
@@ -7876,7 +7876,7 @@
           <a:graphicData uri="http://schemas.openxmlformats.org/presentationml/2006/ole">
             <mc:AlternateContent xmlns:mc="http://schemas.openxmlformats.org/markup-compatibility/2006">
               <mc:Choice xmlns:v="urn:schemas-microsoft-com:vml" Requires="v">
-                <p:oleObj spid="_x0000_s1030" name="Equation" r:id="rId6" imgW="253800" imgH="228600" progId="Equation.3">
+                <p:oleObj spid="_x0000_s1035" name="Equation" r:id="rId6" imgW="253800" imgH="228600" progId="Equation.3">
                   <p:embed/>
                 </p:oleObj>
               </mc:Choice>
@@ -8681,13 +8681,8 @@
             <a:pPr eaLnBrk="1" hangingPunct="1"/>
             <a:r>
               <a:rPr lang="en-US" dirty="0" smtClean="0"/>
-              <a:t>Recursive </a:t>
-            </a:r>
-            <a:r>
-              <a:rPr lang="en-US" dirty="0" smtClean="0"/>
-              <a:t>Data</a:t>
-            </a:r>
-            <a:endParaRPr lang="en-US" dirty="0" smtClean="0"/>
+              <a:t>Recursive Data</a:t>
+            </a:r>
           </a:p>
         </p:txBody>
       </p:sp>

</xml_diff>